<commit_message>
Revised session 3 slides
</commit_message>
<xml_diff>
--- a/Chanco_STA623_BDA_2022_Henrion_Session3.pptx
+++ b/Chanco_STA623_BDA_2022_Henrion_Session3.pptx
@@ -5105,6 +5105,24 @@
                                     </m:r>
                                   </m:sub>
                                 </m:sSub>
+                                <m:r>
+                                  <m:rPr>
+                                    <m:sty m:val="p"/>
+                                  </m:rPr>
+                                  <m:t>|</m:t>
+                                </m:r>
+                                <m:sSup>
+                                  <m:e>
+                                    <m:r>
+                                      <m:t>σ</m:t>
+                                    </m:r>
+                                  </m:e>
+                                  <m:sup>
+                                    <m:r>
+                                      <m:t>2</m:t>
+                                    </m:r>
+                                  </m:sup>
+                                </m:sSup>
                               </m:e>
                             </m:d>
                           </m:e>
@@ -7733,7 +7751,7 @@
                 </a14:m>
                 <a:r>
                   <a:rPr/>
-                  <a:t>. Together with point estimates for the uncertainty asscoaited with these estimates (usually under the form of standard errors), these allow inference in their own right.</a:t>
+                  <a:t>. Together with point estimates for the uncertainty associated with these estimates (usually under the form of standard errors), these allow inference in their own right.</a:t>
                 </a:r>
               </a:p>
               <a:p>
@@ -7871,7 +7889,7 @@
               <a:rPr>
                 <a:hlinkClick r:id="rId2"/>
               </a:rPr>
-              <a:t>https://github.com/gitMarcH/Chanco_STA623</a:t>
+              <a:t>https://github.com/gitMarcH/UNIMA_STA623</a:t>
             </a:r>
           </a:p>
         </p:txBody>
@@ -11131,7 +11149,7 @@
                             <m:mr>
                               <m:e>
                                 <m:r>
-                                  <m:t>1</m:t>
+                                  <m:t>0</m:t>
                                 </m:r>
                                 <m:r>
                                   <m:t>  </m:t>
@@ -11170,7 +11188,7 @@
                             <m:mr>
                               <m:e>
                                 <m:r>
-                                  <m:t>0</m:t>
+                                  <m:t>1</m:t>
                                 </m:r>
                                 <m:r>
                                   <m:t>  </m:t>
@@ -19529,7 +19547,7 @@
                             </m:rPr>
                             <m:t>,</m:t>
                           </m:r>
-                          <m:sSub>
+                          <m:sSubSup>
                             <m:e>
                               <m:r>
                                 <m:t>σ</m:t>
@@ -19540,7 +19558,12 @@
                                 <m:t>n</m:t>
                               </m:r>
                             </m:sub>
-                          </m:sSub>
+                            <m:sup>
+                              <m:r>
+                                <m:t>2</m:t>
+                              </m:r>
+                            </m:sup>
+                          </m:sSubSup>
                         </m:e>
                       </m:d>
                     </m:oMath>

</xml_diff>

<commit_message>
Revised Session 3 and Session 4 slides
</commit_message>
<xml_diff>
--- a/Chanco_STA623_BDA_2022_Henrion_Session3.pptx
+++ b/Chanco_STA623_BDA_2022_Henrion_Session3.pptx
@@ -16900,23 +16900,6 @@
                       <m:jc m:val="center"/>
                     </m:oMathParaPr>
                     <m:oMath>
-                      <m:r>
-                        <m:t> </m:t>
-                      </m:r>
-                    </m:oMath>
-                  </m:oMathPara>
-                </a14:m>
-              </a:p>
-              <a:p>
-                <a:pPr lvl="0" marL="0" indent="0">
-                  <a:buNone/>
-                </a:pPr>
-                <a14:m>
-                  <m:oMathPara xmlns:m="http://schemas.openxmlformats.org/officeDocument/2006/math">
-                    <m:oMathParaPr>
-                      <m:jc m:val="center"/>
-                    </m:oMathParaPr>
-                    <m:oMath>
                       <m:f>
                         <m:fPr>
                           <m:type m:val="bar"/>
@@ -17588,33 +17571,7 @@
                 </a:pPr>
                 <a:r>
                   <a:rPr/>
-                  <a:t>Bayes factor = how to update our beliefs having observed data.</a:t>
-                </a:r>
-              </a:p>
-              <a:p>
-                <a:pPr lvl="0" marL="0" indent="0">
-                  <a:buNone/>
-                </a:pPr>
-                <a14:m>
-                  <m:oMathPara xmlns:m="http://schemas.openxmlformats.org/officeDocument/2006/math">
-                    <m:oMathParaPr>
-                      <m:jc m:val="center"/>
-                    </m:oMathParaPr>
-                    <m:oMath>
-                      <m:r>
-                        <m:t> </m:t>
-                      </m:r>
-                    </m:oMath>
-                  </m:oMathPara>
-                </a14:m>
-              </a:p>
-              <a:p>
-                <a:pPr lvl="0" marL="0" indent="0">
-                  <a:buNone/>
-                </a:pPr>
-                <a:r>
-                  <a:rPr/>
-                  <a:t>There is a relationship between Bayes factors and frequentist p-values.</a:t>
+                  <a:t>Bayes factor = how to update our beliefs having observed data. There is a relationship between Bayes factors and frequentist p-values.</a:t>
                 </a:r>
               </a:p>
             </p:txBody>

</xml_diff>